<commit_message>
Updated presentations for Momentum.
</commit_message>
<xml_diff>
--- a/Presenations/2023 Presentations/AccessibilityTesting101.pptx
+++ b/Presenations/2023 Presentations/AccessibilityTesting101.pptx
@@ -3011,7 +3011,7 @@
         </a:bodyPr>
         <a:lstStyle/>
         <a:p>
-          <a:pPr marL="0" lvl="0" indent="0" algn="ctr" defTabSz="1555750">
+          <a:pPr marL="0" lvl="0" indent="0" algn="ctr" defTabSz="1600200">
             <a:lnSpc>
               <a:spcPct val="90000"/>
             </a:lnSpc>
@@ -3024,7 +3024,7 @@
             <a:buNone/>
           </a:pPr>
           <a:r>
-            <a:rPr lang="en-US" sz="3500" b="1" kern="1200" dirty="0">
+            <a:rPr lang="en-US" sz="3600" b="1" kern="1200" dirty="0">
               <a:solidFill>
                 <a:schemeClr val="bg1"/>
               </a:solidFill>
@@ -3222,7 +3222,7 @@
         </a:bodyPr>
         <a:lstStyle/>
         <a:p>
-          <a:pPr marL="0" lvl="0" indent="0" algn="ctr" defTabSz="1555750">
+          <a:pPr marL="0" lvl="0" indent="0" algn="ctr" defTabSz="1600200">
             <a:lnSpc>
               <a:spcPct val="90000"/>
             </a:lnSpc>
@@ -3235,7 +3235,7 @@
             <a:buNone/>
           </a:pPr>
           <a:r>
-            <a:rPr lang="en-US" sz="3500" b="1" kern="1200" dirty="0">
+            <a:rPr lang="en-US" sz="3600" b="1" kern="1200" dirty="0">
               <a:solidFill>
                 <a:schemeClr val="bg1"/>
               </a:solidFill>
@@ -3415,7 +3415,7 @@
         </a:bodyPr>
         <a:lstStyle/>
         <a:p>
-          <a:pPr marL="0" lvl="0" indent="0" algn="ctr" defTabSz="1555750">
+          <a:pPr marL="0" lvl="0" indent="0" algn="ctr" defTabSz="1600200">
             <a:lnSpc>
               <a:spcPct val="90000"/>
             </a:lnSpc>
@@ -3428,7 +3428,7 @@
             <a:buNone/>
           </a:pPr>
           <a:r>
-            <a:rPr lang="en-US" sz="3500" b="1" kern="1200" dirty="0">
+            <a:rPr lang="en-US" sz="3600" b="1" kern="1200" dirty="0">
               <a:solidFill>
                 <a:schemeClr val="bg1"/>
               </a:solidFill>
@@ -6027,7 +6027,7 @@
           <a:p>
             <a:fld id="{BEFAACEF-CC9A-483E-9B56-DECAFB57975A}" type="datetimeFigureOut">
               <a:rPr lang="en-US" smtClean="0"/>
-              <a:t>9/4/2023</a:t>
+              <a:t>10/19/2023</a:t>
             </a:fld>
             <a:endParaRPr lang="en-US"/>
           </a:p>
@@ -8088,7 +8088,7 @@
           <a:p>
             <a:fld id="{BA049CC4-5A97-47DC-86B9-9927E3A2D5F5}" type="datetime1">
               <a:rPr lang="en-US" smtClean="0"/>
-              <a:t>9/4/2023</a:t>
+              <a:t>10/19/2023</a:t>
             </a:fld>
             <a:endParaRPr lang="en-US"/>
           </a:p>
@@ -8360,7 +8360,7 @@
           <a:p>
             <a:fld id="{08A11C66-9C87-4BA8-9534-5EF145E66FE7}" type="datetime1">
               <a:rPr lang="en-US" smtClean="0"/>
-              <a:t>9/4/2023</a:t>
+              <a:t>10/19/2023</a:t>
             </a:fld>
             <a:endParaRPr lang="en-US"/>
           </a:p>
@@ -8591,7 +8591,7 @@
           <a:p>
             <a:fld id="{5AE480A1-3E8F-4FEB-9473-F28D5BA2CE2F}" type="datetime1">
               <a:rPr lang="en-US" smtClean="0"/>
-              <a:t>9/4/2023</a:t>
+              <a:t>10/19/2023</a:t>
             </a:fld>
             <a:endParaRPr lang="en-US"/>
           </a:p>
@@ -8901,7 +8901,7 @@
           <a:p>
             <a:fld id="{51941244-449B-4313-BB5D-CEC8D390AC83}" type="datetime1">
               <a:rPr lang="en-US" smtClean="0"/>
-              <a:t>9/4/2023</a:t>
+              <a:t>10/19/2023</a:t>
             </a:fld>
             <a:endParaRPr lang="en-US"/>
           </a:p>
@@ -9374,7 +9374,7 @@
           <a:p>
             <a:fld id="{D3AAB994-AF9D-407F-AC45-491F65672FB8}" type="datetime1">
               <a:rPr lang="en-US" smtClean="0"/>
-              <a:t>9/4/2023</a:t>
+              <a:t>10/19/2023</a:t>
             </a:fld>
             <a:endParaRPr lang="en-US"/>
           </a:p>
@@ -9921,7 +9921,7 @@
           <a:p>
             <a:fld id="{95B69CAA-71E9-4E32-8F4F-8B1877E6E416}" type="datetime1">
               <a:rPr lang="en-US" smtClean="0"/>
-              <a:t>9/4/2023</a:t>
+              <a:t>10/19/2023</a:t>
             </a:fld>
             <a:endParaRPr lang="en-US"/>
           </a:p>
@@ -10695,7 +10695,7 @@
           <a:p>
             <a:fld id="{4F1F7796-6626-4944-B793-E85205E429DA}" type="datetime1">
               <a:rPr lang="en-US" smtClean="0"/>
-              <a:t>9/4/2023</a:t>
+              <a:t>10/19/2023</a:t>
             </a:fld>
             <a:endParaRPr lang="en-US"/>
           </a:p>
@@ -10870,7 +10870,7 @@
           <a:p>
             <a:fld id="{275BEE86-0E69-41D4-B130-484F9582CF68}" type="datetime1">
               <a:rPr lang="en-US" smtClean="0"/>
-              <a:t>9/4/2023</a:t>
+              <a:t>10/19/2023</a:t>
             </a:fld>
             <a:endParaRPr lang="en-US"/>
           </a:p>
@@ -11093,7 +11093,7 @@
           <a:p>
             <a:fld id="{E8E2E543-8735-43A9-800E-D52D2E6A7570}" type="datetime1">
               <a:rPr lang="en-US" smtClean="0"/>
-              <a:t>9/4/2023</a:t>
+              <a:t>10/19/2023</a:t>
             </a:fld>
             <a:endParaRPr lang="en-US"/>
           </a:p>
@@ -11278,7 +11278,7 @@
           <a:p>
             <a:fld id="{4F562C0E-85F8-4032-A4AC-EAAA621EB697}" type="datetime1">
               <a:rPr lang="en-US" smtClean="0"/>
-              <a:t>9/4/2023</a:t>
+              <a:t>10/19/2023</a:t>
             </a:fld>
             <a:endParaRPr lang="en-US"/>
           </a:p>
@@ -11567,7 +11567,7 @@
           <a:p>
             <a:fld id="{4D4D2949-E030-4779-99B3-FAC018E20B72}" type="datetime1">
               <a:rPr lang="en-US" smtClean="0"/>
-              <a:t>9/4/2023</a:t>
+              <a:t>10/19/2023</a:t>
             </a:fld>
             <a:endParaRPr lang="en-US"/>
           </a:p>
@@ -11814,7 +11814,7 @@
           <a:p>
             <a:fld id="{0F3F8BCC-FB76-4EC4-8AAF-4B5BA4B75FEF}" type="datetime1">
               <a:rPr lang="en-US" smtClean="0"/>
-              <a:t>9/4/2023</a:t>
+              <a:t>10/19/2023</a:t>
             </a:fld>
             <a:endParaRPr lang="en-US"/>
           </a:p>
@@ -12193,7 +12193,7 @@
           <a:p>
             <a:fld id="{7AB60B1E-0147-4747-AD07-17141088A4C3}" type="datetime1">
               <a:rPr lang="en-US" smtClean="0"/>
-              <a:t>9/4/2023</a:t>
+              <a:t>10/19/2023</a:t>
             </a:fld>
             <a:endParaRPr lang="en-US"/>
           </a:p>
@@ -12311,7 +12311,7 @@
           <a:p>
             <a:fld id="{122DC7E5-9295-4EB3-8473-59EEBBFB2383}" type="datetime1">
               <a:rPr lang="en-US" smtClean="0"/>
-              <a:t>9/4/2023</a:t>
+              <a:t>10/19/2023</a:t>
             </a:fld>
             <a:endParaRPr lang="en-US"/>
           </a:p>
@@ -12406,7 +12406,7 @@
           <a:p>
             <a:fld id="{915BDD53-BBE8-4710-8261-574287A899BD}" type="datetime1">
               <a:rPr lang="en-US" smtClean="0"/>
-              <a:t>9/4/2023</a:t>
+              <a:t>10/19/2023</a:t>
             </a:fld>
             <a:endParaRPr lang="en-US"/>
           </a:p>
@@ -12655,7 +12655,7 @@
           <a:p>
             <a:fld id="{68C84FA3-F6D9-4634-9C02-2941F1994736}" type="datetime1">
               <a:rPr lang="en-US" smtClean="0"/>
-              <a:t>9/4/2023</a:t>
+              <a:t>10/19/2023</a:t>
             </a:fld>
             <a:endParaRPr lang="en-US"/>
           </a:p>
@@ -12912,7 +12912,7 @@
           <a:p>
             <a:fld id="{DAC35DB0-0D5A-4AF5-B91D-F5AC233569C2}" type="datetime1">
               <a:rPr lang="en-US" smtClean="0"/>
-              <a:t>9/4/2023</a:t>
+              <a:t>10/19/2023</a:t>
             </a:fld>
             <a:endParaRPr lang="en-US"/>
           </a:p>
@@ -13155,7 +13155,7 @@
           <a:p>
             <a:fld id="{22AFDDC1-071C-48BE-AEB0-C522838D21A3}" type="datetime1">
               <a:rPr lang="en-US" smtClean="0"/>
-              <a:t>9/4/2023</a:t>
+              <a:t>10/19/2023</a:t>
             </a:fld>
             <a:endParaRPr lang="en-US"/>
           </a:p>
@@ -15834,7 +15834,7 @@
             </a:pPr>
             <a:r>
               <a:rPr lang="en-US" dirty="0"/>
-              <a:t>By creating an experience where people can all access the same information and services, we help people:</a:t>
+              <a:t>By creating an experience where people can all access the same information and services, we help everyone:</a:t>
             </a:r>
           </a:p>
           <a:p>
@@ -15846,25 +15846,25 @@
           <a:p>
             <a:r>
               <a:rPr lang="en-US" dirty="0"/>
-              <a:t>Feel more welcome (employee/customer retention)</a:t>
+              <a:t>feel more welcome (employee/customer retention)</a:t>
             </a:r>
           </a:p>
           <a:p>
             <a:r>
               <a:rPr lang="en-US" dirty="0"/>
-              <a:t>Encourage diversity in our communities and workplaces</a:t>
+              <a:t>encourage diversity in our communities and workplaces</a:t>
             </a:r>
           </a:p>
           <a:p>
             <a:r>
               <a:rPr lang="en-US" dirty="0"/>
-              <a:t>Be more innovative</a:t>
+              <a:t>be more innovative</a:t>
             </a:r>
           </a:p>
           <a:p>
             <a:r>
               <a:rPr lang="en-US" dirty="0"/>
-              <a:t>Don’t miss out on the market</a:t>
+              <a:t>not miss out on the market</a:t>
             </a:r>
           </a:p>
           <a:p>
@@ -15987,24 +15987,9 @@
         </p:spPr>
         <p:txBody>
           <a:bodyPr>
-            <a:normAutofit fontScale="92500" lnSpcReduction="10000"/>
+            <a:normAutofit lnSpcReduction="10000"/>
           </a:bodyPr>
           <a:lstStyle/>
-          <a:p>
-            <a:endParaRPr lang="en-US" b="1" dirty="0"/>
-          </a:p>
-          <a:p>
-            <a:r>
-              <a:rPr lang="en-US" b="1" dirty="0"/>
-              <a:t>Experience</a:t>
-            </a:r>
-          </a:p>
-          <a:p>
-            <a:r>
-              <a:rPr lang="en-US" b="1" dirty="0"/>
-              <a:t>User Feedback</a:t>
-            </a:r>
-          </a:p>
           <a:p>
             <a:r>
               <a:rPr lang="en-US" b="1" dirty="0"/>
@@ -16106,6 +16091,18 @@
                 </a:schemeClr>
               </a:solidFill>
             </a:endParaRPr>
+          </a:p>
+          <a:p>
+            <a:r>
+              <a:rPr lang="en-US" b="1" dirty="0"/>
+              <a:t>Experience</a:t>
+            </a:r>
+          </a:p>
+          <a:p>
+            <a:r>
+              <a:rPr lang="en-US" b="1" dirty="0"/>
+              <a:t>User Feedback</a:t>
+            </a:r>
           </a:p>
         </p:txBody>
       </p:sp>
@@ -16256,7 +16253,7 @@
           </a:p>
           <a:p>
             <a:r>
-              <a:rPr lang="en-US" sz="1800" b="1" dirty="0"/>
+              <a:rPr lang="en-US" sz="1800" dirty="0"/>
               <a:t>Example Test Methods/Plans:</a:t>
             </a:r>
           </a:p>

</xml_diff>

<commit_message>
Updated Accessibility Testing 101
</commit_message>
<xml_diff>
--- a/Presenations/2023 Presentations/AccessibilityTesting101.pptx
+++ b/Presenations/2023 Presentations/AccessibilityTesting101.pptx
@@ -15858,13 +15858,13 @@
           <a:p>
             <a:r>
               <a:rPr lang="en-US" dirty="0"/>
-              <a:t>be more innovative</a:t>
+              <a:t>encourage innovation and progress</a:t>
             </a:r>
           </a:p>
           <a:p>
             <a:r>
               <a:rPr lang="en-US" dirty="0"/>
-              <a:t>not miss out on the market</a:t>
+              <a:t>avoid missing out on the market</a:t>
             </a:r>
           </a:p>
           <a:p>

</xml_diff>

<commit_message>
Updated US and London Accessibility Testing 101
</commit_message>
<xml_diff>
--- a/Presenations/2023 Presentations/AccessibilityTesting101.pptx
+++ b/Presenations/2023 Presentations/AccessibilityTesting101.pptx
@@ -15987,7 +15987,7 @@
         </p:spPr>
         <p:txBody>
           <a:bodyPr>
-            <a:normAutofit lnSpcReduction="10000"/>
+            <a:normAutofit fontScale="92500" lnSpcReduction="10000"/>
           </a:bodyPr>
           <a:lstStyle/>
           <a:p>
@@ -16048,8 +16048,19 @@
           <a:p>
             <a:pPr lvl="1"/>
             <a:r>
-              <a:rPr lang="en-US" dirty="0"/>
-              <a:t>Section 508 of the Rehabilitation Act of 1973</a:t>
+              <a:rPr lang="en-US" sz="2000" dirty="0"/>
+              <a:t>Section 508 of the Rehabilitation </a:t>
+            </a:r>
+            <a:r>
+              <a:rPr lang="en-US" sz="2000"/>
+              <a:t>Act of 1973 (USA)</a:t>
+            </a:r>
+          </a:p>
+          <a:p>
+            <a:pPr lvl="1"/>
+            <a:r>
+              <a:rPr lang="en-US" sz="2000" dirty="0"/>
+              <a:t>Section 255 of the Communications Act (USA)</a:t>
             </a:r>
           </a:p>
           <a:p>

</xml_diff>

<commit_message>
Updated accessibility testing presentations.
</commit_message>
<xml_diff>
--- a/Presenations/2023 Presentations/AccessibilityTesting101.pptx
+++ b/Presenations/2023 Presentations/AccessibilityTesting101.pptx
@@ -5,7 +5,7 @@
     <p:sldMasterId id="2147483708" r:id="rId1"/>
   </p:sldMasterIdLst>
   <p:notesMasterIdLst>
-    <p:notesMasterId r:id="rId19"/>
+    <p:notesMasterId r:id="rId21"/>
   </p:notesMasterIdLst>
   <p:sldIdLst>
     <p:sldId id="256" r:id="rId2"/>
@@ -22,9 +22,11 @@
     <p:sldId id="280" r:id="rId13"/>
     <p:sldId id="281" r:id="rId14"/>
     <p:sldId id="276" r:id="rId15"/>
-    <p:sldId id="277" r:id="rId16"/>
-    <p:sldId id="271" r:id="rId17"/>
-    <p:sldId id="272" r:id="rId18"/>
+    <p:sldId id="283" r:id="rId16"/>
+    <p:sldId id="284" r:id="rId17"/>
+    <p:sldId id="277" r:id="rId18"/>
+    <p:sldId id="271" r:id="rId19"/>
+    <p:sldId id="272" r:id="rId20"/>
   </p:sldIdLst>
   <p:sldSz cx="12192000" cy="6858000"/>
   <p:notesSz cx="7099300" cy="9385300"/>
@@ -6934,7 +6936,7 @@
     </p:spTree>
     <p:extLst>
       <p:ext uri="{BB962C8B-B14F-4D97-AF65-F5344CB8AC3E}">
-        <p14:creationId xmlns:p14="http://schemas.microsoft.com/office/powerpoint/2010/main" val="1593273751"/>
+        <p14:creationId xmlns:p14="http://schemas.microsoft.com/office/powerpoint/2010/main" val="3047289829"/>
       </p:ext>
     </p:extLst>
   </p:cSld>
@@ -7018,7 +7020,7 @@
     </p:spTree>
     <p:extLst>
       <p:ext uri="{BB962C8B-B14F-4D97-AF65-F5344CB8AC3E}">
-        <p14:creationId xmlns:p14="http://schemas.microsoft.com/office/powerpoint/2010/main" val="1964582518"/>
+        <p14:creationId xmlns:p14="http://schemas.microsoft.com/office/powerpoint/2010/main" val="3986831029"/>
       </p:ext>
     </p:extLst>
   </p:cSld>
@@ -7094,6 +7096,174 @@
             <a:fld id="{297094E8-3009-47D0-9423-EBC369D53B0E}" type="slidenum">
               <a:rPr lang="en-US" smtClean="0"/>
               <a:t>17</a:t>
+            </a:fld>
+            <a:endParaRPr lang="en-US"/>
+          </a:p>
+        </p:txBody>
+      </p:sp>
+    </p:spTree>
+    <p:extLst>
+      <p:ext uri="{BB962C8B-B14F-4D97-AF65-F5344CB8AC3E}">
+        <p14:creationId xmlns:p14="http://schemas.microsoft.com/office/powerpoint/2010/main" val="1593273751"/>
+      </p:ext>
+    </p:extLst>
+  </p:cSld>
+  <p:clrMapOvr>
+    <a:masterClrMapping/>
+  </p:clrMapOvr>
+</p:notes>
+</file>
+
+<file path=ppt/notesSlides/notesSlide18.xml><?xml version="1.0" encoding="utf-8"?>
+<p:notes xmlns:a="http://schemas.openxmlformats.org/drawingml/2006/main" xmlns:r="http://schemas.openxmlformats.org/officeDocument/2006/relationships" xmlns:p="http://schemas.openxmlformats.org/presentationml/2006/main">
+  <p:cSld>
+    <p:spTree>
+      <p:nvGrpSpPr>
+        <p:cNvPr id="1" name=""/>
+        <p:cNvGrpSpPr/>
+        <p:nvPr/>
+      </p:nvGrpSpPr>
+      <p:grpSpPr>
+        <a:xfrm>
+          <a:off x="0" y="0"/>
+          <a:ext cx="0" cy="0"/>
+          <a:chOff x="0" y="0"/>
+          <a:chExt cx="0" cy="0"/>
+        </a:xfrm>
+      </p:grpSpPr>
+      <p:sp>
+        <p:nvSpPr>
+          <p:cNvPr id="2" name="Slide Image Placeholder 1"/>
+          <p:cNvSpPr>
+            <a:spLocks noGrp="1" noRot="1" noChangeAspect="1"/>
+          </p:cNvSpPr>
+          <p:nvPr>
+            <p:ph type="sldImg"/>
+          </p:nvPr>
+        </p:nvSpPr>
+        <p:spPr/>
+      </p:sp>
+      <p:sp>
+        <p:nvSpPr>
+          <p:cNvPr id="3" name="Notes Placeholder 2"/>
+          <p:cNvSpPr>
+            <a:spLocks noGrp="1"/>
+          </p:cNvSpPr>
+          <p:nvPr>
+            <p:ph type="body" idx="1"/>
+          </p:nvPr>
+        </p:nvSpPr>
+        <p:spPr/>
+        <p:txBody>
+          <a:bodyPr/>
+          <a:lstStyle/>
+          <a:p>
+            <a:endParaRPr lang="en-US" dirty="0"/>
+          </a:p>
+        </p:txBody>
+      </p:sp>
+      <p:sp>
+        <p:nvSpPr>
+          <p:cNvPr id="4" name="Slide Number Placeholder 3"/>
+          <p:cNvSpPr>
+            <a:spLocks noGrp="1"/>
+          </p:cNvSpPr>
+          <p:nvPr>
+            <p:ph type="sldNum" sz="quarter" idx="5"/>
+          </p:nvPr>
+        </p:nvSpPr>
+        <p:spPr/>
+        <p:txBody>
+          <a:bodyPr/>
+          <a:lstStyle/>
+          <a:p>
+            <a:fld id="{297094E8-3009-47D0-9423-EBC369D53B0E}" type="slidenum">
+              <a:rPr lang="en-US" smtClean="0"/>
+              <a:t>18</a:t>
+            </a:fld>
+            <a:endParaRPr lang="en-US"/>
+          </a:p>
+        </p:txBody>
+      </p:sp>
+    </p:spTree>
+    <p:extLst>
+      <p:ext uri="{BB962C8B-B14F-4D97-AF65-F5344CB8AC3E}">
+        <p14:creationId xmlns:p14="http://schemas.microsoft.com/office/powerpoint/2010/main" val="1964582518"/>
+      </p:ext>
+    </p:extLst>
+  </p:cSld>
+  <p:clrMapOvr>
+    <a:masterClrMapping/>
+  </p:clrMapOvr>
+</p:notes>
+</file>
+
+<file path=ppt/notesSlides/notesSlide19.xml><?xml version="1.0" encoding="utf-8"?>
+<p:notes xmlns:a="http://schemas.openxmlformats.org/drawingml/2006/main" xmlns:r="http://schemas.openxmlformats.org/officeDocument/2006/relationships" xmlns:p="http://schemas.openxmlformats.org/presentationml/2006/main">
+  <p:cSld>
+    <p:spTree>
+      <p:nvGrpSpPr>
+        <p:cNvPr id="1" name=""/>
+        <p:cNvGrpSpPr/>
+        <p:nvPr/>
+      </p:nvGrpSpPr>
+      <p:grpSpPr>
+        <a:xfrm>
+          <a:off x="0" y="0"/>
+          <a:ext cx="0" cy="0"/>
+          <a:chOff x="0" y="0"/>
+          <a:chExt cx="0" cy="0"/>
+        </a:xfrm>
+      </p:grpSpPr>
+      <p:sp>
+        <p:nvSpPr>
+          <p:cNvPr id="2" name="Slide Image Placeholder 1"/>
+          <p:cNvSpPr>
+            <a:spLocks noGrp="1" noRot="1" noChangeAspect="1"/>
+          </p:cNvSpPr>
+          <p:nvPr>
+            <p:ph type="sldImg"/>
+          </p:nvPr>
+        </p:nvSpPr>
+        <p:spPr/>
+      </p:sp>
+      <p:sp>
+        <p:nvSpPr>
+          <p:cNvPr id="3" name="Notes Placeholder 2"/>
+          <p:cNvSpPr>
+            <a:spLocks noGrp="1"/>
+          </p:cNvSpPr>
+          <p:nvPr>
+            <p:ph type="body" idx="1"/>
+          </p:nvPr>
+        </p:nvSpPr>
+        <p:spPr/>
+        <p:txBody>
+          <a:bodyPr/>
+          <a:lstStyle/>
+          <a:p>
+            <a:endParaRPr lang="en-US" dirty="0"/>
+          </a:p>
+        </p:txBody>
+      </p:sp>
+      <p:sp>
+        <p:nvSpPr>
+          <p:cNvPr id="4" name="Slide Number Placeholder 3"/>
+          <p:cNvSpPr>
+            <a:spLocks noGrp="1"/>
+          </p:cNvSpPr>
+          <p:nvPr>
+            <p:ph type="sldNum" sz="quarter" idx="5"/>
+          </p:nvPr>
+        </p:nvSpPr>
+        <p:spPr/>
+        <p:txBody>
+          <a:bodyPr/>
+          <a:lstStyle/>
+          <a:p>
+            <a:fld id="{297094E8-3009-47D0-9423-EBC369D53B0E}" type="slidenum">
+              <a:rPr lang="en-US" smtClean="0"/>
+              <a:t>19</a:t>
             </a:fld>
             <a:endParaRPr lang="en-US"/>
           </a:p>
@@ -14229,16 +14399,17 @@
           <a:lstStyle/>
           <a:p>
             <a:r>
-              <a:rPr lang="en-US" dirty="0"/>
+              <a:rPr lang="en-US"/>
               <a:t>Tools and resources</a:t>
             </a:r>
             <a:br>
-              <a:rPr lang="en-US" dirty="0"/>
+              <a:rPr lang="en-US"/>
             </a:br>
             <a:r>
-              <a:rPr lang="en-US" sz="1800" dirty="0"/>
+              <a:rPr lang="en-US" sz="1800"/>
               <a:t>Bookmarklets</a:t>
             </a:r>
+            <a:endParaRPr lang="en-US" sz="1800" dirty="0"/>
           </a:p>
         </p:txBody>
       </p:sp>
@@ -14256,8 +14427,8 @@
         </p:nvSpPr>
         <p:spPr>
           <a:xfrm>
-            <a:off x="731520" y="2413337"/>
-            <a:ext cx="10528663" cy="2246769"/>
+            <a:off x="140725" y="2057401"/>
+            <a:ext cx="6498336" cy="3785652"/>
           </a:xfrm>
           <a:prstGeom prst="rect">
             <a:avLst/>
@@ -14522,6 +14693,36 @@
           </a:p>
         </p:txBody>
       </p:sp>
+      <p:pic>
+        <p:nvPicPr>
+          <p:cNvPr id="7" name="Picture 6" descr="Address and bookmark bar of a browser window with 2 bookmarklets labeled &quot;ANDI&quot; and &quot;Headings&quot; circled.">
+            <a:extLst>
+              <a:ext uri="{FF2B5EF4-FFF2-40B4-BE49-F238E27FC236}">
+                <a16:creationId xmlns:a16="http://schemas.microsoft.com/office/drawing/2014/main" id="{689DDDB4-F053-177C-B063-932D92457B7B}"/>
+              </a:ext>
+            </a:extLst>
+          </p:cNvPr>
+          <p:cNvPicPr>
+            <a:picLocks noChangeAspect="1"/>
+          </p:cNvPicPr>
+          <p:nvPr/>
+        </p:nvPicPr>
+        <p:blipFill>
+          <a:blip r:embed="rId9"/>
+          <a:stretch>
+            <a:fillRect/>
+          </a:stretch>
+        </p:blipFill>
+        <p:spPr>
+          <a:xfrm>
+            <a:off x="6001510" y="2688260"/>
+            <a:ext cx="6049765" cy="1749627"/>
+          </a:xfrm>
+          <a:prstGeom prst="rect">
+            <a:avLst/>
+          </a:prstGeom>
+        </p:spPr>
+      </p:pic>
     </p:spTree>
     <p:extLst>
       <p:ext uri="{BB962C8B-B14F-4D97-AF65-F5344CB8AC3E}">
@@ -14587,6 +14788,206 @@
             </a:br>
             <a:r>
               <a:rPr lang="en-US" sz="1800" dirty="0"/>
+              <a:t>Bookmarklets</a:t>
+            </a:r>
+          </a:p>
+        </p:txBody>
+      </p:sp>
+      <p:pic>
+        <p:nvPicPr>
+          <p:cNvPr id="9" name="Picture 8" descr="A browser window with the ANDI tool open across the top of the page and currently set to its &quot;Focusable elements&quot; tools. As a result, the focusable elements identified by the tool on the page all have a dashed border box around them and the one that currently has focus has a thick, solid, dark pink border.">
+            <a:extLst>
+              <a:ext uri="{FF2B5EF4-FFF2-40B4-BE49-F238E27FC236}">
+                <a16:creationId xmlns:a16="http://schemas.microsoft.com/office/drawing/2014/main" id="{E4FEF2AD-0F22-A41F-6215-68D5E47CCC90}"/>
+              </a:ext>
+            </a:extLst>
+          </p:cNvPr>
+          <p:cNvPicPr>
+            <a:picLocks noChangeAspect="1"/>
+          </p:cNvPicPr>
+          <p:nvPr/>
+        </p:nvPicPr>
+        <p:blipFill>
+          <a:blip r:embed="rId3"/>
+          <a:stretch>
+            <a:fillRect/>
+          </a:stretch>
+        </p:blipFill>
+        <p:spPr>
+          <a:xfrm>
+            <a:off x="1706880" y="1923785"/>
+            <a:ext cx="9168384" cy="4809563"/>
+          </a:xfrm>
+          <a:prstGeom prst="rect">
+            <a:avLst/>
+          </a:prstGeom>
+        </p:spPr>
+      </p:pic>
+    </p:spTree>
+    <p:extLst>
+      <p:ext uri="{BB962C8B-B14F-4D97-AF65-F5344CB8AC3E}">
+        <p14:creationId xmlns:p14="http://schemas.microsoft.com/office/powerpoint/2010/main" val="1375919905"/>
+      </p:ext>
+    </p:extLst>
+  </p:cSld>
+  <p:clrMapOvr>
+    <a:masterClrMapping/>
+  </p:clrMapOvr>
+</p:sld>
+</file>
+
+<file path=ppt/slides/slide16.xml><?xml version="1.0" encoding="utf-8"?>
+<p:sld xmlns:a="http://schemas.openxmlformats.org/drawingml/2006/main" xmlns:r="http://schemas.openxmlformats.org/officeDocument/2006/relationships" xmlns:p="http://schemas.openxmlformats.org/presentationml/2006/main">
+  <p:cSld>
+    <p:spTree>
+      <p:nvGrpSpPr>
+        <p:cNvPr id="1" name=""/>
+        <p:cNvGrpSpPr/>
+        <p:nvPr/>
+      </p:nvGrpSpPr>
+      <p:grpSpPr>
+        <a:xfrm>
+          <a:off x="0" y="0"/>
+          <a:ext cx="0" cy="0"/>
+          <a:chOff x="0" y="0"/>
+          <a:chExt cx="0" cy="0"/>
+        </a:xfrm>
+      </p:grpSpPr>
+      <p:sp>
+        <p:nvSpPr>
+          <p:cNvPr id="2" name="Title 1">
+            <a:extLst>
+              <a:ext uri="{FF2B5EF4-FFF2-40B4-BE49-F238E27FC236}">
+                <a16:creationId xmlns:a16="http://schemas.microsoft.com/office/drawing/2014/main" id="{BFBE0A40-EF52-730B-174C-8DEE5AF23CE4}"/>
+              </a:ext>
+            </a:extLst>
+          </p:cNvPr>
+          <p:cNvSpPr>
+            <a:spLocks noGrp="1"/>
+          </p:cNvSpPr>
+          <p:nvPr>
+            <p:ph type="title"/>
+          </p:nvPr>
+        </p:nvSpPr>
+        <p:spPr>
+          <a:xfrm>
+            <a:off x="1" y="764373"/>
+            <a:ext cx="11506200" cy="1293028"/>
+          </a:xfrm>
+        </p:spPr>
+        <p:txBody>
+          <a:bodyPr/>
+          <a:lstStyle/>
+          <a:p>
+            <a:r>
+              <a:rPr lang="en-US" dirty="0"/>
+              <a:t>Tools and resources</a:t>
+            </a:r>
+            <a:br>
+              <a:rPr lang="en-US" dirty="0"/>
+            </a:br>
+            <a:r>
+              <a:rPr lang="en-US" sz="1800" dirty="0"/>
+              <a:t>Bookmarklets</a:t>
+            </a:r>
+          </a:p>
+        </p:txBody>
+      </p:sp>
+      <p:pic>
+        <p:nvPicPr>
+          <p:cNvPr id="4" name="Picture 3" descr="A browser window with the Headings bookmarklet toggled on and all headings identified by the app have a border around them that is labeled with the heading level they are recognized as.">
+            <a:extLst>
+              <a:ext uri="{FF2B5EF4-FFF2-40B4-BE49-F238E27FC236}">
+                <a16:creationId xmlns:a16="http://schemas.microsoft.com/office/drawing/2014/main" id="{C931904F-65CB-9AB3-6A81-C5793657A397}"/>
+              </a:ext>
+            </a:extLst>
+          </p:cNvPr>
+          <p:cNvPicPr>
+            <a:picLocks noChangeAspect="1"/>
+          </p:cNvPicPr>
+          <p:nvPr/>
+        </p:nvPicPr>
+        <p:blipFill>
+          <a:blip r:embed="rId3"/>
+          <a:stretch>
+            <a:fillRect/>
+          </a:stretch>
+        </p:blipFill>
+        <p:spPr>
+          <a:xfrm>
+            <a:off x="1438656" y="2057401"/>
+            <a:ext cx="9638275" cy="4506786"/>
+          </a:xfrm>
+          <a:prstGeom prst="rect">
+            <a:avLst/>
+          </a:prstGeom>
+        </p:spPr>
+      </p:pic>
+    </p:spTree>
+    <p:extLst>
+      <p:ext uri="{BB962C8B-B14F-4D97-AF65-F5344CB8AC3E}">
+        <p14:creationId xmlns:p14="http://schemas.microsoft.com/office/powerpoint/2010/main" val="327366238"/>
+      </p:ext>
+    </p:extLst>
+  </p:cSld>
+  <p:clrMapOvr>
+    <a:masterClrMapping/>
+  </p:clrMapOvr>
+</p:sld>
+</file>
+
+<file path=ppt/slides/slide17.xml><?xml version="1.0" encoding="utf-8"?>
+<p:sld xmlns:a="http://schemas.openxmlformats.org/drawingml/2006/main" xmlns:r="http://schemas.openxmlformats.org/officeDocument/2006/relationships" xmlns:p="http://schemas.openxmlformats.org/presentationml/2006/main">
+  <p:cSld>
+    <p:spTree>
+      <p:nvGrpSpPr>
+        <p:cNvPr id="1" name=""/>
+        <p:cNvGrpSpPr/>
+        <p:nvPr/>
+      </p:nvGrpSpPr>
+      <p:grpSpPr>
+        <a:xfrm>
+          <a:off x="0" y="0"/>
+          <a:ext cx="0" cy="0"/>
+          <a:chOff x="0" y="0"/>
+          <a:chExt cx="0" cy="0"/>
+        </a:xfrm>
+      </p:grpSpPr>
+      <p:sp>
+        <p:nvSpPr>
+          <p:cNvPr id="2" name="Title 1">
+            <a:extLst>
+              <a:ext uri="{FF2B5EF4-FFF2-40B4-BE49-F238E27FC236}">
+                <a16:creationId xmlns:a16="http://schemas.microsoft.com/office/drawing/2014/main" id="{BFBE0A40-EF52-730B-174C-8DEE5AF23CE4}"/>
+              </a:ext>
+            </a:extLst>
+          </p:cNvPr>
+          <p:cNvSpPr>
+            <a:spLocks noGrp="1"/>
+          </p:cNvSpPr>
+          <p:nvPr>
+            <p:ph type="title"/>
+          </p:nvPr>
+        </p:nvSpPr>
+        <p:spPr>
+          <a:xfrm>
+            <a:off x="1" y="764373"/>
+            <a:ext cx="11506200" cy="1293028"/>
+          </a:xfrm>
+        </p:spPr>
+        <p:txBody>
+          <a:bodyPr/>
+          <a:lstStyle/>
+          <a:p>
+            <a:r>
+              <a:rPr lang="en-US" dirty="0"/>
+              <a:t>Tools and resources</a:t>
+            </a:r>
+            <a:br>
+              <a:rPr lang="en-US" dirty="0"/>
+            </a:br>
+            <a:r>
+              <a:rPr lang="en-US" sz="1800" dirty="0"/>
               <a:t>Books (Physical and </a:t>
             </a:r>
             <a:r>
@@ -14602,7 +15003,7 @@
       </p:sp>
       <p:pic>
         <p:nvPicPr>
-          <p:cNvPr id="4" name="Picture 3" descr="A group of books on a keyboard. The books are (from left to right) &quot;Inclusive Design Patterns&quot; by Heydon Pickering, &quot;Form Design Patterns&quot; by Adam Silver, and &quot;Inclusive Components&quot; by Heydon Pickering.">
+          <p:cNvPr id="4" name="Picture 3" descr="A group of books sitting on top of a keyboard. The books are (from left to right) &quot;Inclusive Design Patterns&quot; by Heydon Pickering, &quot;Form Design Patterns&quot; by Adam Silver, and &quot;Inclusive Components&quot; by Heydon Pickering.">
             <a:extLst>
               <a:ext uri="{FF2B5EF4-FFF2-40B4-BE49-F238E27FC236}">
                 <a16:creationId xmlns:a16="http://schemas.microsoft.com/office/drawing/2014/main" id="{89ADC8BF-1306-74E7-E9E7-91BB82DB87DB}"/>
@@ -14649,7 +15050,7 @@
 </p:sld>
 </file>
 
-<file path=ppt/slides/slide16.xml><?xml version="1.0" encoding="utf-8"?>
+<file path=ppt/slides/slide18.xml><?xml version="1.0" encoding="utf-8"?>
 <p:sld xmlns:a="http://schemas.openxmlformats.org/drawingml/2006/main" xmlns:r="http://schemas.openxmlformats.org/officeDocument/2006/relationships" xmlns:p="http://schemas.openxmlformats.org/presentationml/2006/main">
   <p:cSld>
     <p:spTree>
@@ -15114,7 +15515,7 @@
 </p:sld>
 </file>
 
-<file path=ppt/slides/slide17.xml><?xml version="1.0" encoding="utf-8"?>
+<file path=ppt/slides/slide19.xml><?xml version="1.0" encoding="utf-8"?>
 <p:sld xmlns:a="http://schemas.openxmlformats.org/drawingml/2006/main" xmlns:r="http://schemas.openxmlformats.org/officeDocument/2006/relationships" xmlns:p="http://schemas.openxmlformats.org/presentationml/2006/main">
   <p:cSld>
     <p:spTree>
@@ -16049,11 +16450,7 @@
             <a:pPr lvl="1"/>
             <a:r>
               <a:rPr lang="en-US" sz="2000" dirty="0"/>
-              <a:t>Section 508 of the Rehabilitation </a:t>
-            </a:r>
-            <a:r>
-              <a:rPr lang="en-US" sz="2000"/>
-              <a:t>Act of 1973 (USA)</a:t>
+              <a:t>Section 508 of the Rehabilitation Act of 1973 (USA)</a:t>
             </a:r>
           </a:p>
           <a:p>

</xml_diff>